<commit_message>
Report started - up to final result section
</commit_message>
<xml_diff>
--- a/Detecting Sarcasm on Reddit - Demo.pptx
+++ b/Detecting Sarcasm on Reddit - Demo.pptx
@@ -1344,7 +1344,7 @@
           <a:p>
             <a:fld id="{74C41A7B-7D8F-4B82-ADC0-F567E5BBEEF1}" type="datetimeFigureOut">
               <a:rPr lang="en-GB" smtClean="0"/>
-              <a:t>05/03/2020</a:t>
+              <a:t>17/03/2020</a:t>
             </a:fld>
             <a:endParaRPr lang="en-GB"/>
           </a:p>
@@ -1552,7 +1552,7 @@
           <a:p>
             <a:fld id="{74C41A7B-7D8F-4B82-ADC0-F567E5BBEEF1}" type="datetimeFigureOut">
               <a:rPr lang="en-GB" smtClean="0"/>
-              <a:t>05/03/2020</a:t>
+              <a:t>17/03/2020</a:t>
             </a:fld>
             <a:endParaRPr lang="en-GB"/>
           </a:p>
@@ -1808,7 +1808,7 @@
           <a:p>
             <a:fld id="{74C41A7B-7D8F-4B82-ADC0-F567E5BBEEF1}" type="datetimeFigureOut">
               <a:rPr lang="en-GB" smtClean="0"/>
-              <a:t>05/03/2020</a:t>
+              <a:t>17/03/2020</a:t>
             </a:fld>
             <a:endParaRPr lang="en-GB"/>
           </a:p>
@@ -1982,7 +1982,7 @@
           <a:p>
             <a:fld id="{74C41A7B-7D8F-4B82-ADC0-F567E5BBEEF1}" type="datetimeFigureOut">
               <a:rPr lang="en-GB" smtClean="0"/>
-              <a:t>05/03/2020</a:t>
+              <a:t>17/03/2020</a:t>
             </a:fld>
             <a:endParaRPr lang="en-GB"/>
           </a:p>
@@ -2325,7 +2325,7 @@
           <a:p>
             <a:fld id="{74C41A7B-7D8F-4B82-ADC0-F567E5BBEEF1}" type="datetimeFigureOut">
               <a:rPr lang="en-GB" smtClean="0"/>
-              <a:t>05/03/2020</a:t>
+              <a:t>17/03/2020</a:t>
             </a:fld>
             <a:endParaRPr lang="en-GB"/>
           </a:p>
@@ -2600,7 +2600,7 @@
           <a:p>
             <a:fld id="{74C41A7B-7D8F-4B82-ADC0-F567E5BBEEF1}" type="datetimeFigureOut">
               <a:rPr lang="en-GB" smtClean="0"/>
-              <a:t>05/03/2020</a:t>
+              <a:t>17/03/2020</a:t>
             </a:fld>
             <a:endParaRPr lang="en-GB"/>
           </a:p>
@@ -2979,7 +2979,7 @@
           <a:p>
             <a:fld id="{74C41A7B-7D8F-4B82-ADC0-F567E5BBEEF1}" type="datetimeFigureOut">
               <a:rPr lang="en-GB" smtClean="0"/>
-              <a:t>05/03/2020</a:t>
+              <a:t>17/03/2020</a:t>
             </a:fld>
             <a:endParaRPr lang="en-GB"/>
           </a:p>
@@ -3097,7 +3097,7 @@
           <a:p>
             <a:fld id="{74C41A7B-7D8F-4B82-ADC0-F567E5BBEEF1}" type="datetimeFigureOut">
               <a:rPr lang="en-GB" smtClean="0"/>
-              <a:t>05/03/2020</a:t>
+              <a:t>17/03/2020</a:t>
             </a:fld>
             <a:endParaRPr lang="en-GB"/>
           </a:p>
@@ -3268,7 +3268,7 @@
           <a:p>
             <a:fld id="{74C41A7B-7D8F-4B82-ADC0-F567E5BBEEF1}" type="datetimeFigureOut">
               <a:rPr lang="en-GB" smtClean="0"/>
-              <a:t>05/03/2020</a:t>
+              <a:t>17/03/2020</a:t>
             </a:fld>
             <a:endParaRPr lang="en-GB"/>
           </a:p>
@@ -3622,7 +3622,7 @@
           <a:p>
             <a:fld id="{74C41A7B-7D8F-4B82-ADC0-F567E5BBEEF1}" type="datetimeFigureOut">
               <a:rPr lang="en-GB" smtClean="0"/>
-              <a:t>05/03/2020</a:t>
+              <a:t>17/03/2020</a:t>
             </a:fld>
             <a:endParaRPr lang="en-GB"/>
           </a:p>
@@ -4004,7 +4004,7 @@
           <a:p>
             <a:fld id="{74C41A7B-7D8F-4B82-ADC0-F567E5BBEEF1}" type="datetimeFigureOut">
               <a:rPr lang="en-GB" smtClean="0"/>
-              <a:t>05/03/2020</a:t>
+              <a:t>17/03/2020</a:t>
             </a:fld>
             <a:endParaRPr lang="en-GB"/>
           </a:p>
@@ -4291,7 +4291,7 @@
           <a:p>
             <a:fld id="{74C41A7B-7D8F-4B82-ADC0-F567E5BBEEF1}" type="datetimeFigureOut">
               <a:rPr lang="en-GB" smtClean="0"/>
-              <a:t>05/03/2020</a:t>
+              <a:t>17/03/2020</a:t>
             </a:fld>
             <a:endParaRPr lang="en-GB"/>
           </a:p>
@@ -6262,6 +6262,9 @@
             <a:avLst/>
           </a:prstGeom>
           <a:ln>
+            <a:solidFill>
+              <a:schemeClr val="tx1"/>
+            </a:solidFill>
             <a:tailEnd type="triangle"/>
           </a:ln>
         </p:spPr>
@@ -6305,6 +6308,9 @@
             <a:avLst/>
           </a:prstGeom>
           <a:ln>
+            <a:solidFill>
+              <a:schemeClr val="tx1"/>
+            </a:solidFill>
             <a:tailEnd type="triangle"/>
           </a:ln>
         </p:spPr>
@@ -6495,6 +6501,9 @@
             <a:avLst/>
           </a:prstGeom>
           <a:ln>
+            <a:solidFill>
+              <a:schemeClr val="tx1"/>
+            </a:solidFill>
             <a:tailEnd type="triangle"/>
           </a:ln>
         </p:spPr>
@@ -6537,6 +6546,9 @@
             <a:avLst/>
           </a:prstGeom>
           <a:ln>
+            <a:solidFill>
+              <a:schemeClr val="tx1"/>
+            </a:solidFill>
             <a:tailEnd type="triangle"/>
           </a:ln>
         </p:spPr>
@@ -6653,6 +6665,9 @@
             <a:avLst/>
           </a:prstGeom>
           <a:ln>
+            <a:solidFill>
+              <a:schemeClr val="tx1"/>
+            </a:solidFill>
             <a:tailEnd type="triangle"/>
           </a:ln>
         </p:spPr>
@@ -6808,6 +6823,9 @@
             <a:avLst/>
           </a:prstGeom>
           <a:ln>
+            <a:solidFill>
+              <a:schemeClr val="tx1"/>
+            </a:solidFill>
             <a:tailEnd type="triangle"/>
           </a:ln>
         </p:spPr>
@@ -6850,6 +6868,9 @@
             <a:avLst/>
           </a:prstGeom>
           <a:ln>
+            <a:solidFill>
+              <a:schemeClr val="tx1"/>
+            </a:solidFill>
             <a:tailEnd type="triangle"/>
           </a:ln>
         </p:spPr>

</xml_diff>